<commit_message>
organized files in appropriate directories for submission
</commit_message>
<xml_diff>
--- a/proposal/presentation/finalPresentation.pptx
+++ b/proposal/presentation/finalPresentation.pptx
@@ -8,7 +8,7 @@
     <p:notesMasterId r:id="rId4"/>
   </p:notesMasterIdLst>
   <p:handoutMasterIdLst>
-    <p:handoutMasterId r:id="rId17"/>
+    <p:handoutMasterId r:id="rId16"/>
   </p:handoutMasterIdLst>
   <p:sldIdLst>
     <p:sldId id="256" r:id="rId3"/>
@@ -21,9 +21,8 @@
     <p:sldId id="278" r:id="rId11"/>
     <p:sldId id="277" r:id="rId12"/>
     <p:sldId id="279" r:id="rId13"/>
-    <p:sldId id="280" r:id="rId14"/>
-    <p:sldId id="260" r:id="rId15"/>
-    <p:sldId id="263" r:id="rId16"/>
+    <p:sldId id="260" r:id="rId14"/>
+    <p:sldId id="263" r:id="rId15"/>
   </p:sldIdLst>
   <p:sldSz cx="12192000" cy="6858000"/>
   <p:notesSz cx="7103745" cy="10234295"/>
@@ -160,13 +159,9 @@
             </a:pPr>
             <a:r>
               <a:rPr lang="en-US" altLang="en-US"/>
-              <a:t>Time Saved</a:t>
+              <a:t>Time Saved Vs. Number of Sub-Tasks</a:t>
             </a:r>
-            <a:r>
-              <a:rPr lang="" altLang="en-US"/>
-              <a:t> Vs. Number of Sub-Tasks</a:t>
-            </a:r>
-            <a:endParaRPr lang="" altLang="en-US"/>
+            <a:endParaRPr lang="en-US" altLang="en-US"/>
           </a:p>
         </c:rich>
       </c:tx>
@@ -425,16 +420,8 @@
                   </a:defRPr>
                 </a:pPr>
                 <a:r>
-                  <a:rPr lang="" altLang="en-US"/>
-                  <a:t>Number of </a:t>
-                </a:r>
-                <a:r>
                   <a:rPr lang="en-US" altLang="en-US"/>
-                  <a:t>Sub-Task</a:t>
-                </a:r>
-                <a:r>
-                  <a:rPr lang="" altLang="en-US"/>
-                  <a:t>s</a:t>
+                  <a:t>Number of Sub-Tasks</a:t>
                 </a:r>
                 <a:endParaRPr lang="en-US" altLang="en-US"/>
               </a:p>
@@ -1370,6 +1357,7 @@
         <c:axId val="305672465"/>
         <c:scaling>
           <c:orientation val="minMax"/>
+          <c:min val="0"/>
         </c:scaling>
         <c:delete val="false"/>
         <c:axPos val="l"/>
@@ -2390,13 +2378,9 @@
             </a:pPr>
             <a:r>
               <a:rPr lang="en-US" altLang="en-US"/>
-              <a:t>(6 sub tasks) Compute Time </a:t>
+              <a:t>(6 sub tasks) Compute Time Save (%)</a:t>
             </a:r>
-            <a:r>
-              <a:rPr lang="" altLang="en-US"/>
-              <a:t>Save (%)</a:t>
-            </a:r>
-            <a:endParaRPr lang="" altLang="en-US"/>
+            <a:endParaRPr lang="en-US" altLang="en-US"/>
           </a:p>
         </c:rich>
       </c:tx>
@@ -6440,50 +6424,6 @@
 </p:notes>
 </file>
 
-<file path=ppt/notesSlides/notesSlide7.xml><?xml version="1.0" encoding="utf-8"?>
-<p:notes xmlns:a="http://schemas.openxmlformats.org/drawingml/2006/main" xmlns:r="http://schemas.openxmlformats.org/officeDocument/2006/relationships" xmlns:p="http://schemas.openxmlformats.org/presentationml/2006/main">
-  <p:cSld>
-    <p:spTree>
-      <p:nvGrpSpPr>
-        <p:cNvPr id="1" name=""/>
-        <p:cNvGrpSpPr/>
-        <p:nvPr/>
-      </p:nvGrpSpPr>
-      <p:grpSpPr/>
-      <p:sp>
-        <p:nvSpPr>
-          <p:cNvPr id="2" name="Slide Image Placeholder 1"/>
-          <p:cNvSpPr/>
-          <p:nvPr>
-            <p:ph type="sldImg" idx="2"/>
-          </p:nvPr>
-        </p:nvSpPr>
-        <p:spPr/>
-      </p:sp>
-      <p:sp>
-        <p:nvSpPr>
-          <p:cNvPr id="3" name="Text Placeholder 2"/>
-          <p:cNvSpPr/>
-          <p:nvPr>
-            <p:ph type="body" idx="3"/>
-          </p:nvPr>
-        </p:nvSpPr>
-        <p:spPr/>
-        <p:txBody>
-          <a:bodyPr/>
-          <a:p>
-            <a:endParaRPr lang="en-US"/>
-          </a:p>
-        </p:txBody>
-      </p:sp>
-    </p:spTree>
-  </p:cSld>
-  <p:clrMapOvr>
-    <a:masterClrMapping/>
-  </p:clrMapOvr>
-</p:notes>
-</file>
-
 <file path=ppt/slideLayouts/slideLayout1.xml><?xml version="1.0" encoding="utf-8"?>
 <p:sldLayout xmlns:a="http://schemas.openxmlformats.org/drawingml/2006/main" xmlns:r="http://schemas.openxmlformats.org/officeDocument/2006/relationships" xmlns:p="http://schemas.openxmlformats.org/presentationml/2006/main" type="title" preserve="1">
   <p:cSld name="Title Slide">
@@ -9533,13 +9473,13 @@
           <a:bodyPr/>
           <a:p>
             <a:r>
-              <a:rPr lang="" altLang="en-US" sz="4000">
+              <a:rPr lang="en-US" altLang="en-US" sz="4000">
                 <a:latin typeface="+mn-lt"/>
                 <a:cs typeface="+mn-lt"/>
               </a:rPr>
               <a:t>Time Saved</a:t>
             </a:r>
-            <a:endParaRPr lang="" altLang="en-US" sz="4000">
+            <a:endParaRPr lang="en-US" altLang="en-US" sz="4000">
               <a:latin typeface="+mn-lt"/>
               <a:cs typeface="+mn-lt"/>
             </a:endParaRPr>
@@ -9579,10 +9519,10 @@
               </a:spcAft>
             </a:pPr>
             <a:r>
-              <a:rPr lang="" altLang="en-US" sz="1800"/>
+              <a:rPr lang="en-US" altLang="en-US" sz="1800"/>
               <a:t>Comparing how much time local compute takes vs distributed compute</a:t>
             </a:r>
-            <a:endParaRPr lang="" altLang="en-US" sz="1800"/>
+            <a:endParaRPr lang="en-US" altLang="en-US" sz="1800"/>
           </a:p>
           <a:p>
             <a:pPr lvl="0">
@@ -9596,7 +9536,7 @@
                 <a:spcPts val="0"/>
               </a:spcAft>
             </a:pPr>
-            <a:endParaRPr lang="" altLang="en-US" sz="1800"/>
+            <a:endParaRPr lang="en-US" altLang="en-US" sz="1800"/>
           </a:p>
         </p:txBody>
       </p:sp>
@@ -9952,21 +9892,7 @@
                             <a:latin typeface="DejaVu Math TeX Gyre" panose="02000503000000000000" charset="0"/>
                             <a:cs typeface="DejaVu Math TeX Gyre" panose="02000503000000000000" charset="0"/>
                           </a:rPr>
-                          <m:t> </m:t>
-                        </m:r>
-                        <m:r>
-                          <a:rPr lang="en-US" sz="1400" i="1">
-                            <a:latin typeface="DejaVu Math TeX Gyre" panose="02000503000000000000" charset="0"/>
-                            <a:cs typeface="DejaVu Math TeX Gyre" panose="02000503000000000000" charset="0"/>
-                          </a:rPr>
-                          <m:t>−</m:t>
-                        </m:r>
-                        <m:r>
-                          <a:rPr lang="en-US" sz="1400" i="1">
-                            <a:latin typeface="DejaVu Math TeX Gyre" panose="02000503000000000000" charset="0"/>
-                            <a:cs typeface="DejaVu Math TeX Gyre" panose="02000503000000000000" charset="0"/>
-                          </a:rPr>
-                          <m:t> </m:t>
+                          <m:t> − </m:t>
                         </m:r>
                         <m:r>
                           <a:rPr lang="en-US" sz="1400" i="1">
@@ -10017,10 +9943,10 @@
                   </m:oMath>
                 </a14:m>
                 <a:r>
-                  <a:rPr lang="" altLang="en-US" sz="1400"/>
+                  <a:rPr lang="en-US" altLang="en-US" sz="1400"/>
                   <a:t> * 100</a:t>
                 </a:r>
-                <a:endParaRPr lang="" altLang="en-US" sz="1400"/>
+                <a:endParaRPr lang="en-US" altLang="en-US" sz="1400"/>
               </a:p>
             </p:txBody>
           </p:sp>
@@ -10102,21 +10028,21 @@
         </p:nvSpPr>
         <p:spPr>
           <a:xfrm>
-            <a:off x="483870" y="175895"/>
-            <a:ext cx="5321300" cy="1062990"/>
+            <a:off x="410845" y="258445"/>
+            <a:ext cx="4869180" cy="999490"/>
           </a:xfrm>
         </p:spPr>
         <p:txBody>
           <a:bodyPr/>
           <a:p>
             <a:r>
-              <a:rPr lang="" altLang="en-US" sz="4000">
+              <a:rPr lang="en-US" altLang="en-US" sz="4000">
                 <a:latin typeface="+mn-lt"/>
                 <a:cs typeface="+mn-lt"/>
               </a:rPr>
-              <a:t>How to use?</a:t>
+              <a:t>Conclusion</a:t>
             </a:r>
-            <a:endParaRPr lang="" altLang="en-US" sz="4000">
+            <a:endParaRPr lang="en-US" altLang="en-US" sz="4000">
               <a:latin typeface="+mn-lt"/>
               <a:cs typeface="+mn-lt"/>
             </a:endParaRPr>
@@ -10125,7 +10051,7 @@
       </p:sp>
       <p:sp>
         <p:nvSpPr>
-          <p:cNvPr id="15" name="Content Placeholder 14"/>
+          <p:cNvPr id="3" name="Content Placeholder 2"/>
           <p:cNvSpPr>
             <a:spLocks noGrp="true"/>
           </p:cNvSpPr>
@@ -10135,8 +10061,8 @@
         </p:nvSpPr>
         <p:spPr>
           <a:xfrm>
-            <a:off x="483870" y="1165860"/>
-            <a:ext cx="10787380" cy="1146175"/>
+            <a:off x="410845" y="1345565"/>
+            <a:ext cx="11095990" cy="5200015"/>
           </a:xfrm>
         </p:spPr>
         <p:txBody>
@@ -10144,281 +10070,117 @@
             <a:normAutofit/>
           </a:bodyPr>
           <a:p>
+            <a:pPr>
+              <a:lnSpc>
+                <a:spcPct val="150000"/>
+              </a:lnSpc>
+            </a:pPr>
+            <a:r>
+              <a:rPr lang="en-US" altLang="en-US" sz="1800"/>
+              <a:t>The number of node failures before the distributed approach becomes more time consuming than local computation depends on:</a:t>
+            </a:r>
+            <a:endParaRPr lang="en-US" altLang="en-US" sz="1800"/>
+          </a:p>
+          <a:p>
+            <a:pPr lvl="1">
+              <a:lnSpc>
+                <a:spcPct val="150000"/>
+              </a:lnSpc>
+            </a:pPr>
+            <a:r>
+              <a:rPr lang="en-US" altLang="en-US" sz="1600"/>
+              <a:t>When the worker fails</a:t>
+            </a:r>
+            <a:endParaRPr lang="en-US" altLang="en-US" sz="1600"/>
+          </a:p>
+          <a:p>
+            <a:pPr lvl="1">
+              <a:lnSpc>
+                <a:spcPct val="150000"/>
+              </a:lnSpc>
+            </a:pPr>
+            <a:r>
+              <a:rPr lang="en-US" altLang="en-US" sz="1600"/>
+              <a:t>Is there is a reserve nodes to which the sub-task can be offloaded</a:t>
+            </a:r>
+            <a:endParaRPr lang="en-US" altLang="en-US" sz="1600"/>
+          </a:p>
+          <a:p>
+            <a:pPr lvl="1">
+              <a:lnSpc>
+                <a:spcPct val="150000"/>
+              </a:lnSpc>
+            </a:pPr>
+            <a:endParaRPr lang="en-US" altLang="en-US" sz="1600"/>
+          </a:p>
+          <a:p>
             <a:pPr lvl="0">
               <a:lnSpc>
-                <a:spcPct val="125000"/>
+                <a:spcPct val="150000"/>
               </a:lnSpc>
-              <a:spcBef>
-                <a:spcPts val="1000"/>
-              </a:spcBef>
-              <a:spcAft>
-                <a:spcPts val="0"/>
-              </a:spcAft>
             </a:pPr>
             <a:r>
-              <a:rPr lang="" altLang="en-US" sz="1800"/>
-              <a:t>The main can be configures with the following parameters</a:t>
+              <a:rPr lang="en-US" altLang="en-US" sz="1600"/>
+              <a:t>The granularity of sub-task size depends seems to depend on the hardware specification of the main node</a:t>
             </a:r>
-            <a:endParaRPr lang="" altLang="en-US" sz="1800"/>
-          </a:p>
-          <a:p>
-            <a:pPr marL="800100" lvl="1" indent="-342900">
+            <a:endParaRPr lang="en-US" altLang="en-US" sz="1600"/>
+          </a:p>
+          <a:p>
+            <a:pPr lvl="1">
               <a:lnSpc>
-                <a:spcPct val="125000"/>
+                <a:spcPct val="150000"/>
               </a:lnSpc>
-              <a:spcBef>
-                <a:spcPts val="1000"/>
-              </a:spcBef>
-              <a:spcAft>
-                <a:spcPts val="0"/>
-              </a:spcAft>
-              <a:buAutoNum type="arabicPeriod"/>
             </a:pPr>
-            <a:endParaRPr lang="en-US" altLang="en-US" sz="1620"/>
+            <a:r>
+              <a:rPr lang="en-US" altLang="en-US" sz="1440"/>
+              <a:t>Due to multi-threaded approach</a:t>
+            </a:r>
+            <a:endParaRPr lang="en-US" altLang="en-US" sz="1440"/>
+          </a:p>
+          <a:p>
+            <a:pPr marL="457200" lvl="1" indent="0">
+              <a:lnSpc>
+                <a:spcPct val="150000"/>
+              </a:lnSpc>
+              <a:buNone/>
+            </a:pPr>
+            <a:endParaRPr lang="en-US" altLang="en-US" sz="1440"/>
           </a:p>
           <a:p>
             <a:pPr lvl="0">
               <a:lnSpc>
-                <a:spcPct val="125000"/>
+                <a:spcPct val="150000"/>
               </a:lnSpc>
-              <a:spcBef>
-                <a:spcPts val="1000"/>
-              </a:spcBef>
-              <a:spcAft>
-                <a:spcPts val="0"/>
-              </a:spcAft>
             </a:pPr>
-            <a:endParaRPr lang="en-US" altLang="en-US" sz="1800"/>
-          </a:p>
-        </p:txBody>
-      </p:sp>
-      <p:sp>
-        <p:nvSpPr>
-          <p:cNvPr id="7" name="Content Placeholder 14"/>
-          <p:cNvSpPr>
-            <a:spLocks noGrp="true"/>
-          </p:cNvSpPr>
-          <p:nvPr/>
-        </p:nvSpPr>
-        <p:spPr>
-          <a:xfrm>
-            <a:off x="6288405" y="1238885"/>
-            <a:ext cx="5304790" cy="1146175"/>
-          </a:xfrm>
-          <a:prstGeom prst="rect">
-            <a:avLst/>
-          </a:prstGeom>
-        </p:spPr>
-        <p:txBody>
-          <a:bodyPr vert="horz" lIns="91440" tIns="45720" rIns="91440" bIns="45720" rtlCol="0">
-            <a:normAutofit/>
-          </a:bodyPr>
-          <a:lstStyle>
-            <a:lvl1pPr marL="228600" indent="-228600" algn="l" defTabSz="914400" rtl="0" eaLnBrk="1" latinLnBrk="0" hangingPunct="1">
+            <a:r>
+              <a:rPr lang="en-US" altLang="en-US" sz="1600"/>
+              <a:t>The high level caching mechanism saves a small amount of time if sub-task fails</a:t>
+            </a:r>
+            <a:endParaRPr lang="en-US" altLang="en-US" sz="1600"/>
+          </a:p>
+          <a:p>
+            <a:pPr lvl="1">
               <a:lnSpc>
-                <a:spcPct val="90000"/>
+                <a:spcPct val="150000"/>
               </a:lnSpc>
-              <a:spcBef>
-                <a:spcPts val="1000"/>
-              </a:spcBef>
-              <a:buFont typeface="Arial" panose="020B0604020202020204" pitchFamily="34" charset="0"/>
-              <a:buChar char="•"/>
-              <a:defRPr sz="2000" kern="1200">
-                <a:solidFill>
-                  <a:schemeClr val="tx1">
-                    <a:lumMod val="75000"/>
-                    <a:lumOff val="25000"/>
-                  </a:schemeClr>
-                </a:solidFill>
-                <a:latin typeface="+mn-lt"/>
-                <a:ea typeface="+mn-ea"/>
-                <a:cs typeface="+mn-cs"/>
-              </a:defRPr>
-            </a:lvl1pPr>
-            <a:lvl2pPr marL="685800" indent="-228600" algn="l" defTabSz="914400" rtl="0" eaLnBrk="1" latinLnBrk="0" hangingPunct="1">
+            </a:pPr>
+            <a:r>
+              <a:rPr lang="en-US" altLang="en-US" sz="1440"/>
+              <a:t>With a small storage overhead</a:t>
+            </a:r>
+            <a:endParaRPr lang="en-US" altLang="en-US" sz="1440"/>
+          </a:p>
+          <a:p>
+            <a:pPr lvl="1">
               <a:lnSpc>
-                <a:spcPct val="90000"/>
+                <a:spcPct val="150000"/>
               </a:lnSpc>
-              <a:spcBef>
-                <a:spcPts val="500"/>
-              </a:spcBef>
-              <a:buFont typeface="Arial" panose="020B0604020202020204" pitchFamily="34" charset="0"/>
-              <a:buChar char="•"/>
-              <a:defRPr sz="1800" kern="1200">
-                <a:solidFill>
-                  <a:schemeClr val="tx1">
-                    <a:lumMod val="75000"/>
-                    <a:lumOff val="25000"/>
-                  </a:schemeClr>
-                </a:solidFill>
-                <a:latin typeface="+mn-lt"/>
-                <a:ea typeface="+mn-ea"/>
-                <a:cs typeface="+mn-cs"/>
-              </a:defRPr>
-            </a:lvl2pPr>
-            <a:lvl3pPr marL="1143000" indent="-228600" algn="l" defTabSz="914400" rtl="0" eaLnBrk="1" latinLnBrk="0" hangingPunct="1">
-              <a:lnSpc>
-                <a:spcPct val="90000"/>
-              </a:lnSpc>
-              <a:spcBef>
-                <a:spcPts val="500"/>
-              </a:spcBef>
-              <a:buFont typeface="Arial" panose="020B0604020202020204" pitchFamily="34" charset="0"/>
-              <a:buChar char="•"/>
-              <a:defRPr sz="1600" kern="1200">
-                <a:solidFill>
-                  <a:schemeClr val="tx1">
-                    <a:lumMod val="75000"/>
-                    <a:lumOff val="25000"/>
-                  </a:schemeClr>
-                </a:solidFill>
-                <a:latin typeface="+mn-lt"/>
-                <a:ea typeface="+mn-ea"/>
-                <a:cs typeface="+mn-cs"/>
-              </a:defRPr>
-            </a:lvl3pPr>
-            <a:lvl4pPr marL="1600200" indent="-228600" algn="l" defTabSz="914400" rtl="0" eaLnBrk="1" latinLnBrk="0" hangingPunct="1">
-              <a:lnSpc>
-                <a:spcPct val="90000"/>
-              </a:lnSpc>
-              <a:spcBef>
-                <a:spcPts val="500"/>
-              </a:spcBef>
-              <a:buFont typeface="Arial" panose="020B0604020202020204" pitchFamily="34" charset="0"/>
-              <a:buChar char="•"/>
-              <a:defRPr sz="1600" kern="1200">
-                <a:solidFill>
-                  <a:schemeClr val="tx1">
-                    <a:lumMod val="75000"/>
-                    <a:lumOff val="25000"/>
-                  </a:schemeClr>
-                </a:solidFill>
-                <a:latin typeface="+mn-lt"/>
-                <a:ea typeface="+mn-ea"/>
-                <a:cs typeface="+mn-cs"/>
-              </a:defRPr>
-            </a:lvl4pPr>
-            <a:lvl5pPr marL="2057400" indent="-228600" algn="l" defTabSz="914400" rtl="0" eaLnBrk="1" latinLnBrk="0" hangingPunct="1">
-              <a:lnSpc>
-                <a:spcPct val="90000"/>
-              </a:lnSpc>
-              <a:spcBef>
-                <a:spcPts val="500"/>
-              </a:spcBef>
-              <a:buFont typeface="Arial" panose="020B0604020202020204" pitchFamily="34" charset="0"/>
-              <a:buChar char="•"/>
-              <a:defRPr sz="1600" kern="1200">
-                <a:solidFill>
-                  <a:schemeClr val="tx1">
-                    <a:lumMod val="75000"/>
-                    <a:lumOff val="25000"/>
-                  </a:schemeClr>
-                </a:solidFill>
-                <a:latin typeface="+mn-lt"/>
-                <a:ea typeface="+mn-ea"/>
-                <a:cs typeface="+mn-cs"/>
-              </a:defRPr>
-            </a:lvl5pPr>
-            <a:lvl6pPr marL="2514600" indent="-228600" algn="l" defTabSz="914400" rtl="0" eaLnBrk="1" latinLnBrk="0" hangingPunct="1">
-              <a:lnSpc>
-                <a:spcPct val="90000"/>
-              </a:lnSpc>
-              <a:spcBef>
-                <a:spcPts val="500"/>
-              </a:spcBef>
-              <a:buFont typeface="Arial" panose="020B0604020202020204" pitchFamily="34" charset="0"/>
-              <a:buChar char="•"/>
-              <a:defRPr sz="1800" kern="1200">
-                <a:solidFill>
-                  <a:schemeClr val="tx1"/>
-                </a:solidFill>
-                <a:latin typeface="+mn-lt"/>
-                <a:ea typeface="+mn-ea"/>
-                <a:cs typeface="+mn-cs"/>
-              </a:defRPr>
-            </a:lvl6pPr>
-            <a:lvl7pPr marL="2971800" indent="-228600" algn="l" defTabSz="914400" rtl="0" eaLnBrk="1" latinLnBrk="0" hangingPunct="1">
-              <a:lnSpc>
-                <a:spcPct val="90000"/>
-              </a:lnSpc>
-              <a:spcBef>
-                <a:spcPts val="500"/>
-              </a:spcBef>
-              <a:buFont typeface="Arial" panose="020B0604020202020204" pitchFamily="34" charset="0"/>
-              <a:buChar char="•"/>
-              <a:defRPr sz="1800" kern="1200">
-                <a:solidFill>
-                  <a:schemeClr val="tx1"/>
-                </a:solidFill>
-                <a:latin typeface="+mn-lt"/>
-                <a:ea typeface="+mn-ea"/>
-                <a:cs typeface="+mn-cs"/>
-              </a:defRPr>
-            </a:lvl7pPr>
-            <a:lvl8pPr marL="3429000" indent="-228600" algn="l" defTabSz="914400" rtl="0" eaLnBrk="1" latinLnBrk="0" hangingPunct="1">
-              <a:lnSpc>
-                <a:spcPct val="90000"/>
-              </a:lnSpc>
-              <a:spcBef>
-                <a:spcPts val="500"/>
-              </a:spcBef>
-              <a:buFont typeface="Arial" panose="020B0604020202020204" pitchFamily="34" charset="0"/>
-              <a:buChar char="•"/>
-              <a:defRPr sz="1800" kern="1200">
-                <a:solidFill>
-                  <a:schemeClr val="tx1"/>
-                </a:solidFill>
-                <a:latin typeface="+mn-lt"/>
-                <a:ea typeface="+mn-ea"/>
-                <a:cs typeface="+mn-cs"/>
-              </a:defRPr>
-            </a:lvl8pPr>
-            <a:lvl9pPr marL="3886200" indent="-228600" algn="l" defTabSz="914400" rtl="0" eaLnBrk="1" latinLnBrk="0" hangingPunct="1">
-              <a:lnSpc>
-                <a:spcPct val="90000"/>
-              </a:lnSpc>
-              <a:spcBef>
-                <a:spcPts val="500"/>
-              </a:spcBef>
-              <a:buFont typeface="Arial" panose="020B0604020202020204" pitchFamily="34" charset="0"/>
-              <a:buChar char="•"/>
-              <a:defRPr sz="1800" kern="1200">
-                <a:solidFill>
-                  <a:schemeClr val="tx1"/>
-                </a:solidFill>
-                <a:latin typeface="+mn-lt"/>
-                <a:ea typeface="+mn-ea"/>
-                <a:cs typeface="+mn-cs"/>
-              </a:defRPr>
-            </a:lvl9pPr>
-          </a:lstStyle>
-          <a:p>
-            <a:pPr lvl="0">
-              <a:lnSpc>
-                <a:spcPct val="125000"/>
-              </a:lnSpc>
-              <a:spcBef>
-                <a:spcPts val="1000"/>
-              </a:spcBef>
-              <a:spcAft>
-                <a:spcPts val="0"/>
-              </a:spcAft>
             </a:pPr>
-            <a:endParaRPr lang="en-US" altLang="en-US" sz="1800"/>
-          </a:p>
-          <a:p>
-            <a:pPr lvl="0">
-              <a:lnSpc>
-                <a:spcPct val="125000"/>
-              </a:lnSpc>
-              <a:spcBef>
-                <a:spcPts val="1000"/>
-              </a:spcBef>
-              <a:spcAft>
-                <a:spcPts val="0"/>
-              </a:spcAft>
-            </a:pPr>
-            <a:endParaRPr lang="en-US" altLang="en-US" sz="1800"/>
+            <a:r>
+              <a:rPr lang="en-US" altLang="en-US" sz="1440"/>
+              <a:t>Without any noticable impact when there are no node failures</a:t>
+            </a:r>
+            <a:endParaRPr lang="en-US" altLang="en-US" sz="1440"/>
           </a:p>
         </p:txBody>
       </p:sp>
@@ -10460,195 +10222,6 @@
         </p:nvSpPr>
         <p:spPr>
           <a:xfrm>
-            <a:off x="410845" y="258445"/>
-            <a:ext cx="4869180" cy="999490"/>
-          </a:xfrm>
-        </p:spPr>
-        <p:txBody>
-          <a:bodyPr/>
-          <a:p>
-            <a:r>
-              <a:rPr lang="" altLang="en-US" sz="4000">
-                <a:latin typeface="+mn-lt"/>
-                <a:cs typeface="+mn-lt"/>
-              </a:rPr>
-              <a:t>Conclusion</a:t>
-            </a:r>
-            <a:endParaRPr lang="" altLang="en-US" sz="4000">
-              <a:latin typeface="+mn-lt"/>
-              <a:cs typeface="+mn-lt"/>
-            </a:endParaRPr>
-          </a:p>
-        </p:txBody>
-      </p:sp>
-      <p:sp>
-        <p:nvSpPr>
-          <p:cNvPr id="3" name="Content Placeholder 2"/>
-          <p:cNvSpPr>
-            <a:spLocks noGrp="true"/>
-          </p:cNvSpPr>
-          <p:nvPr>
-            <p:ph idx="1"/>
-          </p:nvPr>
-        </p:nvSpPr>
-        <p:spPr>
-          <a:xfrm>
-            <a:off x="410845" y="1345565"/>
-            <a:ext cx="11095990" cy="5200015"/>
-          </a:xfrm>
-        </p:spPr>
-        <p:txBody>
-          <a:bodyPr>
-            <a:normAutofit/>
-          </a:bodyPr>
-          <a:p>
-            <a:pPr>
-              <a:lnSpc>
-                <a:spcPct val="150000"/>
-              </a:lnSpc>
-            </a:pPr>
-            <a:r>
-              <a:rPr lang="" altLang="en-US" sz="1800"/>
-              <a:t>The number of node failures before the distributed approach becomes more time consuming than local computation depends on:</a:t>
-            </a:r>
-            <a:endParaRPr lang="" altLang="en-US" sz="1800"/>
-          </a:p>
-          <a:p>
-            <a:pPr lvl="1">
-              <a:lnSpc>
-                <a:spcPct val="150000"/>
-              </a:lnSpc>
-            </a:pPr>
-            <a:r>
-              <a:rPr lang="" altLang="en-US" sz="1600"/>
-              <a:t>When the worker fails</a:t>
-            </a:r>
-            <a:endParaRPr lang="" altLang="en-US" sz="1600"/>
-          </a:p>
-          <a:p>
-            <a:pPr lvl="1">
-              <a:lnSpc>
-                <a:spcPct val="150000"/>
-              </a:lnSpc>
-            </a:pPr>
-            <a:r>
-              <a:rPr lang="" altLang="en-US" sz="1600"/>
-              <a:t>Is there is a reserve nodes to which the sub-task can be offloaded</a:t>
-            </a:r>
-            <a:endParaRPr lang="" altLang="en-US" sz="1600"/>
-          </a:p>
-          <a:p>
-            <a:pPr lvl="0">
-              <a:lnSpc>
-                <a:spcPct val="150000"/>
-              </a:lnSpc>
-            </a:pPr>
-            <a:r>
-              <a:rPr lang="" altLang="en-US" sz="1600"/>
-              <a:t>The granularity of sub-task size depends seems to depend on the hardware specification of the main node</a:t>
-            </a:r>
-            <a:endParaRPr lang="" altLang="en-US" sz="1600"/>
-          </a:p>
-          <a:p>
-            <a:pPr lvl="1">
-              <a:lnSpc>
-                <a:spcPct val="150000"/>
-              </a:lnSpc>
-            </a:pPr>
-            <a:r>
-              <a:rPr lang="" altLang="en-US" sz="1440"/>
-              <a:t>Due to multi-threaded approach</a:t>
-            </a:r>
-            <a:endParaRPr lang="" altLang="en-US" sz="1440"/>
-          </a:p>
-          <a:p>
-            <a:pPr lvl="1">
-              <a:lnSpc>
-                <a:spcPct val="150000"/>
-              </a:lnSpc>
-            </a:pPr>
-            <a:r>
-              <a:rPr lang="" altLang="en-US" sz="1440"/>
-              <a:t>More sub-tasks = smaller sub-task size which leads to more threads</a:t>
-            </a:r>
-            <a:endParaRPr lang="" altLang="en-US" sz="1440"/>
-          </a:p>
-          <a:p>
-            <a:pPr lvl="0">
-              <a:lnSpc>
-                <a:spcPct val="150000"/>
-              </a:lnSpc>
-            </a:pPr>
-            <a:r>
-              <a:rPr lang="" altLang="en-US" sz="1600"/>
-              <a:t>The high level caching mechanism saves a small amount of time if sub-task fails</a:t>
-            </a:r>
-            <a:endParaRPr lang="" altLang="en-US" sz="1600"/>
-          </a:p>
-          <a:p>
-            <a:pPr lvl="1">
-              <a:lnSpc>
-                <a:spcPct val="150000"/>
-              </a:lnSpc>
-            </a:pPr>
-            <a:r>
-              <a:rPr lang="" altLang="en-US" sz="1440"/>
-              <a:t>With a small storage overhead</a:t>
-            </a:r>
-            <a:endParaRPr lang="" altLang="en-US" sz="1440"/>
-          </a:p>
-          <a:p>
-            <a:pPr lvl="1">
-              <a:lnSpc>
-                <a:spcPct val="150000"/>
-              </a:lnSpc>
-            </a:pPr>
-            <a:r>
-              <a:rPr lang="" altLang="en-US" sz="1440"/>
-              <a:t>Without any noticable impact when there are no node failures</a:t>
-            </a:r>
-            <a:endParaRPr lang="" altLang="en-US" sz="1440"/>
-          </a:p>
-        </p:txBody>
-      </p:sp>
-    </p:spTree>
-  </p:cSld>
-  <p:clrMapOvr>
-    <a:masterClrMapping/>
-  </p:clrMapOvr>
-</p:sld>
-</file>
-
-<file path=ppt/slides/slide13.xml><?xml version="1.0" encoding="utf-8"?>
-<p:sld xmlns:a="http://schemas.openxmlformats.org/drawingml/2006/main" xmlns:r="http://schemas.openxmlformats.org/officeDocument/2006/relationships" xmlns:p="http://schemas.openxmlformats.org/presentationml/2006/main">
-  <p:cSld>
-    <p:bg>
-      <p:bgPr>
-        <a:solidFill>
-          <a:schemeClr val="bg1"/>
-        </a:solidFill>
-        <a:effectLst/>
-      </p:bgPr>
-    </p:bg>
-    <p:spTree>
-      <p:nvGrpSpPr>
-        <p:cNvPr id="1" name=""/>
-        <p:cNvGrpSpPr/>
-        <p:nvPr/>
-      </p:nvGrpSpPr>
-      <p:grpSpPr/>
-      <p:sp>
-        <p:nvSpPr>
-          <p:cNvPr id="2" name="Title 1"/>
-          <p:cNvSpPr>
-            <a:spLocks noGrp="true"/>
-          </p:cNvSpPr>
-          <p:nvPr>
-            <p:ph type="title"/>
-          </p:nvPr>
-        </p:nvSpPr>
-        <p:spPr>
-          <a:xfrm>
             <a:off x="4431665" y="939165"/>
             <a:ext cx="3423920" cy="1045210"/>
           </a:xfrm>
@@ -10659,7 +10232,7 @@
           </a:bodyPr>
           <a:p>
             <a:r>
-              <a:rPr lang="" altLang="en-US" sz="5400">
+              <a:rPr lang="en-US" altLang="en-US" sz="5400">
                 <a:solidFill>
                   <a:schemeClr val="tx1"/>
                 </a:solidFill>
@@ -10675,7 +10248,7 @@
               </a:rPr>
               <a:t>Thank You</a:t>
             </a:r>
-            <a:endParaRPr lang="" altLang="en-US" sz="5400">
+            <a:endParaRPr lang="en-US" altLang="en-US" sz="5400">
               <a:solidFill>
                 <a:schemeClr val="tx1"/>
               </a:solidFill>
@@ -10741,7 +10314,7 @@
           </a:lstStyle>
           <a:p>
             <a:r>
-              <a:rPr lang="" altLang="en-US" sz="7200">
+              <a:rPr lang="en-US" altLang="en-US" sz="7200">
                 <a:solidFill>
                   <a:schemeClr val="tx1"/>
                 </a:solidFill>
@@ -10757,7 +10330,7 @@
               </a:rPr>
               <a:t>Questions?</a:t>
             </a:r>
-            <a:endParaRPr lang="" altLang="en-US" sz="7200">
+            <a:endParaRPr lang="en-US" altLang="en-US" sz="7200">
               <a:solidFill>
                 <a:schemeClr val="tx1"/>
               </a:solidFill>
@@ -10821,13 +10394,13 @@
           <a:p>
             <a:pPr algn="l"/>
             <a:r>
-              <a:rPr lang="" altLang="en-US" sz="4000">
+              <a:rPr lang="en-US" altLang="en-US" sz="4000">
                 <a:latin typeface="+mn-lt"/>
                 <a:cs typeface="+mn-lt"/>
               </a:rPr>
               <a:t>Outline</a:t>
             </a:r>
-            <a:endParaRPr lang="" altLang="en-US" sz="4000">
+            <a:endParaRPr lang="en-US" altLang="en-US" sz="4000">
               <a:latin typeface="+mn-lt"/>
               <a:cs typeface="+mn-lt"/>
             </a:endParaRPr>
@@ -10852,7 +10425,7 @@
         </p:spPr>
         <p:txBody>
           <a:bodyPr>
-            <a:normAutofit lnSpcReduction="10000"/>
+            <a:normAutofit lnSpcReduction="20000"/>
           </a:bodyPr>
           <a:p>
             <a:pPr lvl="0">
@@ -10864,10 +10437,10 @@
               </a:spcAft>
             </a:pPr>
             <a:r>
-              <a:rPr lang="" altLang="en-US"/>
+              <a:rPr lang="en-US" altLang="en-US"/>
               <a:t>Motivation</a:t>
             </a:r>
-            <a:endParaRPr lang="" altLang="en-US"/>
+            <a:endParaRPr lang="en-US" altLang="en-US"/>
           </a:p>
           <a:p>
             <a:pPr lvl="0">
@@ -10879,10 +10452,10 @@
               </a:spcAft>
             </a:pPr>
             <a:r>
-              <a:rPr lang="" altLang="en-US"/>
+              <a:rPr lang="en-US" altLang="en-US"/>
               <a:t>Objectives &amp; Challenges</a:t>
             </a:r>
-            <a:endParaRPr lang="" altLang="en-US"/>
+            <a:endParaRPr lang="en-US" altLang="en-US"/>
           </a:p>
           <a:p>
             <a:pPr lvl="0">
@@ -10894,10 +10467,10 @@
               </a:spcAft>
             </a:pPr>
             <a:r>
-              <a:rPr lang="" altLang="en-US"/>
+              <a:rPr lang="en-US" altLang="en-US"/>
               <a:t>Design</a:t>
             </a:r>
-            <a:endParaRPr lang="" altLang="en-US"/>
+            <a:endParaRPr lang="en-US" altLang="en-US"/>
           </a:p>
           <a:p>
             <a:pPr lvl="1">
@@ -10909,10 +10482,10 @@
               </a:spcAft>
             </a:pPr>
             <a:r>
-              <a:rPr lang="" altLang="en-US" sz="1800"/>
+              <a:rPr lang="en-US" altLang="en-US" sz="1800"/>
               <a:t>System Architecture</a:t>
             </a:r>
-            <a:endParaRPr lang="" altLang="en-US" sz="1800"/>
+            <a:endParaRPr lang="en-US" altLang="en-US" sz="1800"/>
           </a:p>
           <a:p>
             <a:pPr lvl="1">
@@ -10924,10 +10497,10 @@
               </a:spcAft>
             </a:pPr>
             <a:r>
-              <a:rPr lang="" altLang="en-US"/>
+              <a:rPr lang="en-US" altLang="en-US"/>
               <a:t>Example Execution</a:t>
             </a:r>
-            <a:endParaRPr lang="" altLang="en-US"/>
+            <a:endParaRPr lang="en-US" altLang="en-US"/>
           </a:p>
           <a:p>
             <a:pPr lvl="0">
@@ -10939,10 +10512,10 @@
               </a:spcAft>
             </a:pPr>
             <a:r>
-              <a:rPr lang="" altLang="en-US"/>
+              <a:rPr lang="en-US" altLang="en-US"/>
               <a:t>Evaluation</a:t>
             </a:r>
-            <a:endParaRPr lang="" altLang="en-US"/>
+            <a:endParaRPr lang="en-US" altLang="en-US"/>
           </a:p>
           <a:p>
             <a:pPr lvl="1">
@@ -10954,18 +10527,12 @@
               </a:spcAft>
             </a:pPr>
             <a:r>
-              <a:rPr lang="" altLang="en-US">
-                <a:sym typeface="+mn-ea"/>
-              </a:rPr>
-              <a:t>Sub-t</a:t>
-            </a:r>
-            <a:r>
               <a:rPr lang="en-US" altLang="en-US">
                 <a:sym typeface="+mn-ea"/>
               </a:rPr>
-              <a:t>ask granularity</a:t>
+              <a:t>Sub-task granularity</a:t>
             </a:r>
-            <a:endParaRPr lang="" altLang="en-US" sz="1800"/>
+            <a:endParaRPr lang="en-US" altLang="en-US" sz="1800"/>
           </a:p>
           <a:p>
             <a:pPr lvl="1">
@@ -10977,10 +10544,10 @@
               </a:spcAft>
             </a:pPr>
             <a:r>
-              <a:rPr lang="" altLang="en-US" sz="1800"/>
+              <a:rPr lang="en-US" altLang="en-US" sz="1800"/>
               <a:t>Node Failures</a:t>
             </a:r>
-            <a:endParaRPr lang="" altLang="en-US" sz="1800"/>
+            <a:endParaRPr lang="en-US" altLang="en-US" sz="1800"/>
           </a:p>
           <a:p>
             <a:pPr lvl="1">
@@ -10997,7 +10564,7 @@
               </a:rPr>
               <a:t>Caching Vs No Caching</a:t>
             </a:r>
-            <a:endParaRPr lang="" altLang="en-US"/>
+            <a:endParaRPr lang="en-US" altLang="en-US"/>
           </a:p>
           <a:p>
             <a:pPr lvl="1">
@@ -11009,10 +10576,10 @@
               </a:spcAft>
             </a:pPr>
             <a:r>
-              <a:rPr lang="" altLang="en-US"/>
+              <a:rPr lang="en-US" altLang="en-US"/>
               <a:t>Time saved</a:t>
             </a:r>
-            <a:endParaRPr lang="" altLang="en-US"/>
+            <a:endParaRPr lang="en-US" altLang="en-US"/>
           </a:p>
           <a:p>
             <a:pPr lvl="0">
@@ -11024,25 +10591,10 @@
               </a:spcAft>
             </a:pPr>
             <a:r>
-              <a:rPr lang="" altLang="en-US" sz="2000"/>
-              <a:t>How to use?</a:t>
-            </a:r>
-            <a:endParaRPr lang="" altLang="en-US"/>
-          </a:p>
-          <a:p>
-            <a:pPr lvl="0">
-              <a:lnSpc>
-                <a:spcPct val="125000"/>
-              </a:lnSpc>
-              <a:spcAft>
-                <a:spcPts val="0"/>
-              </a:spcAft>
-            </a:pPr>
-            <a:r>
-              <a:rPr lang="" altLang="en-US"/>
+              <a:rPr lang="en-US" altLang="en-US"/>
               <a:t>Summary</a:t>
             </a:r>
-            <a:endParaRPr lang="" altLang="en-US"/>
+            <a:endParaRPr lang="en-US" altLang="en-US"/>
           </a:p>
         </p:txBody>
       </p:sp>
@@ -11130,19 +10682,7 @@
               <a:rPr lang="en-US" altLang="en-US">
                 <a:sym typeface="+mn-ea"/>
               </a:rPr>
-              <a:t>Split the matrix multiplication into sub-tasks and offload to </a:t>
-            </a:r>
-            <a:r>
-              <a:rPr lang="" altLang="en-US">
-                <a:sym typeface="+mn-ea"/>
-              </a:rPr>
-              <a:t>worker </a:t>
-            </a:r>
-            <a:r>
-              <a:rPr lang="en-US" altLang="en-US">
-                <a:sym typeface="+mn-ea"/>
-              </a:rPr>
-              <a:t>nodes</a:t>
+              <a:t>Split the matrix multiplication into sub-tasks and offload to worker nodes</a:t>
             </a:r>
             <a:endParaRPr lang="en-US" altLang="en-US"/>
           </a:p>
@@ -11561,16 +11101,9 @@
                 <a:latin typeface="+mn-lt"/>
                 <a:cs typeface="+mn-lt"/>
               </a:rPr>
-              <a:t>Objective</a:t>
+              <a:t>Objectives</a:t>
             </a:r>
-            <a:r>
-              <a:rPr lang="" altLang="en-US" sz="3200">
-                <a:latin typeface="+mn-lt"/>
-                <a:cs typeface="+mn-lt"/>
-              </a:rPr>
-              <a:t>s</a:t>
-            </a:r>
-            <a:endParaRPr lang="" altLang="en-US" sz="3200">
+            <a:endParaRPr lang="en-US" altLang="en-US" sz="3200">
               <a:latin typeface="+mn-lt"/>
               <a:cs typeface="+mn-lt"/>
             </a:endParaRPr>
@@ -11711,13 +11244,13 @@
           <a:bodyPr/>
           <a:p>
             <a:r>
-              <a:rPr lang="" altLang="en-US" sz="4000">
+              <a:rPr lang="en-US" altLang="en-US" sz="4000">
                 <a:latin typeface="+mn-lt"/>
                 <a:cs typeface="+mn-lt"/>
               </a:rPr>
               <a:t>Design : Main Node</a:t>
             </a:r>
-            <a:endParaRPr lang="" altLang="en-US" sz="4000">
+            <a:endParaRPr lang="en-US" altLang="en-US" sz="4000">
               <a:latin typeface="+mn-lt"/>
               <a:cs typeface="+mn-lt"/>
             </a:endParaRPr>
@@ -11757,12 +11290,12 @@
               </a:spcAft>
             </a:pPr>
             <a:r>
-              <a:rPr lang="" altLang="en-US">
+              <a:rPr lang="en-US" altLang="en-US">
                 <a:sym typeface="+mn-ea"/>
               </a:rPr>
               <a:t>Split multiplication into 4 sub tasks</a:t>
             </a:r>
-            <a:endParaRPr lang="" altLang="en-US">
+            <a:endParaRPr lang="en-US" altLang="en-US">
               <a:sym typeface="+mn-ea"/>
             </a:endParaRPr>
           </a:p>
@@ -11779,10 +11312,10 @@
               </a:spcAft>
             </a:pPr>
             <a:r>
-              <a:rPr lang="" altLang="en-US"/>
+              <a:rPr lang="en-US" altLang="en-US"/>
               <a:t>Dispatch threads to handle each worker</a:t>
             </a:r>
-            <a:endParaRPr lang="" altLang="en-US"/>
+            <a:endParaRPr lang="en-US" altLang="en-US"/>
           </a:p>
           <a:p>
             <a:pPr lvl="0">
@@ -11797,10 +11330,10 @@
               </a:spcAft>
             </a:pPr>
             <a:r>
-              <a:rPr lang="" altLang="en-US"/>
+              <a:rPr lang="en-US" altLang="en-US"/>
               <a:t>Compress portions of matrix data required for each worker</a:t>
             </a:r>
-            <a:endParaRPr lang="" altLang="en-US"/>
+            <a:endParaRPr lang="en-US" altLang="en-US"/>
           </a:p>
           <a:p>
             <a:pPr lvl="0">
@@ -11815,10 +11348,10 @@
               </a:spcAft>
             </a:pPr>
             <a:r>
-              <a:rPr lang="" altLang="en-US"/>
+              <a:rPr lang="en-US" altLang="en-US"/>
               <a:t>Send data to worker</a:t>
             </a:r>
-            <a:endParaRPr lang="" altLang="en-US"/>
+            <a:endParaRPr lang="en-US" altLang="en-US"/>
           </a:p>
         </p:txBody>
       </p:sp>
@@ -12089,34 +11622,34 @@
                 </a:bodyPr>
                 <a:p>
                   <a:r>
-                    <a:rPr lang="" altLang="en-US" sz="1400"/>
+                    <a:rPr lang="en-US" altLang="en-US" sz="1400"/>
                     <a:t>   1           1</a:t>
                   </a:r>
-                  <a:endParaRPr lang="" altLang="en-US" sz="1400"/>
+                  <a:endParaRPr lang="en-US" altLang="en-US" sz="1400"/>
                 </a:p>
                 <a:p>
                   <a:r>
-                    <a:rPr lang="" altLang="en-US" sz="1400"/>
+                    <a:rPr lang="en-US" altLang="en-US" sz="1400"/>
                     <a:t>   2           2</a:t>
                   </a:r>
-                  <a:endParaRPr lang="" altLang="en-US" sz="1400"/>
+                  <a:endParaRPr lang="en-US" altLang="en-US" sz="1400"/>
                 </a:p>
                 <a:p>
-                  <a:endParaRPr lang="" altLang="en-US" sz="1400"/>
+                  <a:endParaRPr lang="en-US" altLang="en-US" sz="1400"/>
                 </a:p>
                 <a:p>
                   <a:r>
-                    <a:rPr lang="" altLang="en-US" sz="1400"/>
+                    <a:rPr lang="en-US" altLang="en-US" sz="1400"/>
                     <a:t>   3           3</a:t>
                   </a:r>
-                  <a:endParaRPr lang="" altLang="en-US" sz="1400"/>
+                  <a:endParaRPr lang="en-US" altLang="en-US" sz="1400"/>
                 </a:p>
                 <a:p>
                   <a:r>
-                    <a:rPr lang="" altLang="en-US" sz="1400"/>
+                    <a:rPr lang="en-US" altLang="en-US" sz="1400"/>
                     <a:t>   4           4</a:t>
                   </a:r>
-                  <a:endParaRPr lang="" altLang="en-US" sz="1400"/>
+                  <a:endParaRPr lang="en-US" altLang="en-US" sz="1400"/>
                 </a:p>
               </p:txBody>
             </p:sp>
@@ -12684,30 +12217,14 @@
                 <a:p>
                   <a:r>
                     <a:rPr lang="en-US" altLang="en-US" sz="1400"/>
-                    <a:t>   1           </a:t>
-                  </a:r>
-                  <a:r>
-                    <a:rPr lang="" altLang="en-US" sz="1400"/>
-                    <a:t>2</a:t>
+                    <a:t>   1           2</a:t>
                   </a:r>
                   <a:endParaRPr lang="en-US" altLang="en-US" sz="1400"/>
                 </a:p>
                 <a:p>
                   <a:r>
                     <a:rPr lang="en-US" altLang="en-US" sz="1400"/>
-                    <a:t>   </a:t>
-                  </a:r>
-                  <a:r>
-                    <a:rPr lang="" altLang="en-US" sz="1400"/>
-                    <a:t>3</a:t>
-                  </a:r>
-                  <a:r>
-                    <a:rPr lang="en-US" altLang="en-US" sz="1400"/>
-                    <a:t>           </a:t>
-                  </a:r>
-                  <a:r>
-                    <a:rPr lang="" altLang="en-US" sz="1400"/>
-                    <a:t>4</a:t>
+                    <a:t>   3           4</a:t>
                   </a:r>
                   <a:endParaRPr lang="en-US" altLang="en-US" sz="1400"/>
                 </a:p>
@@ -12717,34 +12234,14 @@
                 <a:p>
                   <a:r>
                     <a:rPr lang="en-US" altLang="en-US" sz="1400"/>
-                    <a:t>   </a:t>
-                  </a:r>
-                  <a:r>
-                    <a:rPr lang="" altLang="en-US" sz="1400"/>
-                    <a:t>1</a:t>
-                  </a:r>
-                  <a:r>
-                    <a:rPr lang="en-US" altLang="en-US" sz="1400"/>
-                    <a:t>           </a:t>
-                  </a:r>
-                  <a:r>
-                    <a:rPr lang="" altLang="en-US" sz="1400"/>
-                    <a:t>2</a:t>
+                    <a:t>   1           2</a:t>
                   </a:r>
                   <a:endParaRPr lang="en-US" altLang="en-US" sz="1400"/>
                 </a:p>
                 <a:p>
                   <a:r>
                     <a:rPr lang="en-US" altLang="en-US" sz="1400"/>
-                    <a:t>   </a:t>
-                  </a:r>
-                  <a:r>
-                    <a:rPr lang="" altLang="en-US" sz="1400"/>
-                    <a:t>3</a:t>
-                  </a:r>
-                  <a:r>
-                    <a:rPr lang="en-US" altLang="en-US" sz="1400"/>
-                    <a:t>           4</a:t>
+                    <a:t>   3           4</a:t>
                   </a:r>
                   <a:endParaRPr lang="en-US" altLang="en-US" sz="1400"/>
                 </a:p>
@@ -12988,15 +12485,7 @@
                 <a:p>
                   <a:r>
                     <a:rPr lang="en-US" altLang="en-US" sz="1400"/>
-                    <a:t>   1          </a:t>
-                  </a:r>
-                  <a:r>
-                    <a:rPr lang="" altLang="en-US" sz="1400"/>
-                    <a:t> </a:t>
-                  </a:r>
-                  <a:r>
-                    <a:rPr lang="en-US" altLang="en-US" sz="1400"/>
-                    <a:t> 2</a:t>
+                    <a:t>   1            2</a:t>
                   </a:r>
                   <a:endParaRPr lang="en-US" altLang="en-US" sz="1400"/>
                 </a:p>
@@ -13009,13 +12498,9 @@
                 <a:p>
                   <a:r>
                     <a:rPr lang="en-US" altLang="en-US" sz="1400"/>
-                    <a:t>   3           </a:t>
+                    <a:t>   3            4</a:t>
                   </a:r>
-                  <a:r>
-                    <a:rPr lang="" altLang="en-US" sz="1400"/>
-                    <a:t> 4</a:t>
-                  </a:r>
-                  <a:endParaRPr lang="" altLang="en-US" sz="1400"/>
+                  <a:endParaRPr lang="en-US" altLang="en-US" sz="1400"/>
                 </a:p>
               </p:txBody>
             </p:sp>
@@ -13043,10 +12528,10 @@
             </a:bodyPr>
             <a:p>
               <a:r>
-                <a:rPr lang="" altLang="en-US"/>
+                <a:rPr lang="en-US" altLang="en-US"/>
                 <a:t>x</a:t>
               </a:r>
-              <a:endParaRPr lang="" altLang="en-US"/>
+              <a:endParaRPr lang="en-US" altLang="en-US"/>
             </a:p>
           </p:txBody>
         </p:sp>
@@ -13072,10 +12557,10 @@
             </a:bodyPr>
             <a:p>
               <a:r>
-                <a:rPr lang="" altLang="en-US"/>
+                <a:rPr lang="en-US" altLang="en-US"/>
                 <a:t>=</a:t>
               </a:r>
-              <a:endParaRPr lang="" altLang="en-US"/>
+              <a:endParaRPr lang="en-US" altLang="en-US"/>
             </a:p>
           </p:txBody>
         </p:sp>
@@ -13155,16 +12640,9 @@
                 <a:latin typeface="+mn-lt"/>
                 <a:cs typeface="+mn-lt"/>
               </a:rPr>
-              <a:t>Design : </a:t>
+              <a:t>Design : Worker Side</a:t>
             </a:r>
-            <a:r>
-              <a:rPr lang="" altLang="en-US" sz="4000">
-                <a:latin typeface="+mn-lt"/>
-                <a:cs typeface="+mn-lt"/>
-              </a:rPr>
-              <a:t>Worker Side</a:t>
-            </a:r>
-            <a:endParaRPr lang="" altLang="en-US" sz="4000">
+            <a:endParaRPr lang="en-US" altLang="en-US" sz="4000">
               <a:latin typeface="+mn-lt"/>
               <a:cs typeface="+mn-lt"/>
             </a:endParaRPr>
@@ -13204,7 +12682,7 @@
               </a:spcAft>
             </a:pPr>
             <a:r>
-              <a:rPr lang="" altLang="en-US">
+              <a:rPr lang="en-US" altLang="en-US">
                 <a:sym typeface="+mn-ea"/>
               </a:rPr>
               <a:t>Receive matrix data</a:t>
@@ -13242,7 +12720,7 @@
               </a:spcAft>
             </a:pPr>
             <a:r>
-              <a:rPr lang="" altLang="en-US"/>
+              <a:rPr lang="en-US" altLang="en-US"/>
               <a:t>Compute results</a:t>
             </a:r>
             <a:endParaRPr lang="en-US" altLang="en-US"/>
@@ -13274,7 +12752,7 @@
               </a:spcAft>
             </a:pPr>
             <a:r>
-              <a:rPr lang="" altLang="en-US"/>
+              <a:rPr lang="en-US" altLang="en-US"/>
               <a:t>Send results back</a:t>
             </a:r>
             <a:endParaRPr lang="en-US" altLang="en-US"/>
@@ -13320,13 +12798,13 @@
           <a:p>
             <a:pPr algn="l"/>
             <a:r>
-              <a:rPr lang="" altLang="en-US" sz="4000">
+              <a:rPr lang="en-US" altLang="en-US" sz="4000">
                 <a:latin typeface="+mn-lt"/>
                 <a:cs typeface="+mn-lt"/>
               </a:rPr>
               <a:t>Evaluations</a:t>
             </a:r>
-            <a:endParaRPr lang="" altLang="en-US" sz="4000">
+            <a:endParaRPr lang="en-US" altLang="en-US" sz="4000">
               <a:latin typeface="+mn-lt"/>
               <a:cs typeface="+mn-lt"/>
             </a:endParaRPr>
@@ -13364,13 +12842,7 @@
               <a:rPr lang="en-US" altLang="en-US" sz="2400">
                 <a:sym typeface="+mn-ea"/>
               </a:rPr>
-              <a:t>Main Node</a:t>
-            </a:r>
-            <a:r>
-              <a:rPr lang="" altLang="en-US" sz="2400">
-                <a:sym typeface="+mn-ea"/>
-              </a:rPr>
-              <a:t> &amp; Worker Nodes</a:t>
+              <a:t>Main Node &amp; Worker Nodes</a:t>
             </a:r>
             <a:endParaRPr lang="en-US" altLang="en-US" sz="2400">
               <a:sym typeface="+mn-ea"/>
@@ -13505,19 +12977,7 @@
               <a:rPr lang="en-US" altLang="en-US" sz="2000">
                 <a:sym typeface="+mn-ea"/>
               </a:rPr>
-              <a:t>Sub-task </a:t>
-            </a:r>
-            <a:r>
-              <a:rPr lang="" altLang="en-US" sz="2000">
-                <a:sym typeface="+mn-ea"/>
-              </a:rPr>
-              <a:t>G</a:t>
-            </a:r>
-            <a:r>
-              <a:rPr lang="en-US" altLang="en-US" sz="2000">
-                <a:sym typeface="+mn-ea"/>
-              </a:rPr>
-              <a:t>ranularity</a:t>
+              <a:t>Sub-task Granularity</a:t>
             </a:r>
             <a:endParaRPr lang="en-US" altLang="en-US" sz="2000">
               <a:sym typeface="+mn-ea"/>
@@ -13553,19 +13013,7 @@
               <a:rPr lang="en-US" altLang="en-US" sz="2000">
                 <a:sym typeface="+mn-ea"/>
               </a:rPr>
-              <a:t>Node </a:t>
-            </a:r>
-            <a:r>
-              <a:rPr lang="" altLang="en-US" sz="2000">
-                <a:sym typeface="+mn-ea"/>
-              </a:rPr>
-              <a:t>F</a:t>
-            </a:r>
-            <a:r>
-              <a:rPr lang="en-US" altLang="en-US" sz="2000">
-                <a:sym typeface="+mn-ea"/>
-              </a:rPr>
-              <a:t>ailures</a:t>
+              <a:t>Node Failures</a:t>
             </a:r>
             <a:endParaRPr lang="en-US" altLang="en-US" sz="2000">
               <a:sym typeface="+mn-ea"/>
@@ -13635,19 +13083,7 @@
               <a:rPr lang="en-US" altLang="en-US" sz="2000">
                 <a:sym typeface="+mn-ea"/>
               </a:rPr>
-              <a:t>Time </a:t>
-            </a:r>
-            <a:r>
-              <a:rPr lang="" altLang="en-US" sz="2000">
-                <a:sym typeface="+mn-ea"/>
-              </a:rPr>
-              <a:t>S</a:t>
-            </a:r>
-            <a:r>
-              <a:rPr lang="en-US" altLang="en-US" sz="2000">
-                <a:sym typeface="+mn-ea"/>
-              </a:rPr>
-              <a:t>aved</a:t>
+              <a:t>Time Saved</a:t>
             </a:r>
             <a:endParaRPr lang="en-US" altLang="en-US" sz="2000">
               <a:sym typeface="+mn-ea"/>
@@ -13705,13 +13141,13 @@
           <a:p>
             <a:pPr algn="l"/>
             <a:r>
-              <a:rPr lang="" altLang="en-US" sz="4000">
+              <a:rPr lang="en-US" altLang="en-US" sz="4000">
                 <a:latin typeface="+mn-lt"/>
                 <a:cs typeface="+mn-lt"/>
               </a:rPr>
               <a:t>Testing Hardware</a:t>
             </a:r>
-            <a:endParaRPr lang="" altLang="en-US" sz="4000">
+            <a:endParaRPr lang="en-US" altLang="en-US" sz="4000">
               <a:latin typeface="+mn-lt"/>
               <a:cs typeface="+mn-lt"/>
             </a:endParaRPr>
@@ -13759,13 +13195,13 @@
           <a:bodyPr/>
           <a:p>
             <a:r>
-              <a:rPr lang="" altLang="en-US" sz="4000">
+              <a:rPr lang="en-US" altLang="en-US" sz="4000">
                 <a:latin typeface="+mn-lt"/>
                 <a:cs typeface="+mn-lt"/>
               </a:rPr>
               <a:t>Sub-task Granularity</a:t>
             </a:r>
-            <a:endParaRPr lang="" altLang="en-US" sz="4000">
+            <a:endParaRPr lang="en-US" altLang="en-US" sz="4000">
               <a:latin typeface="+mn-lt"/>
               <a:cs typeface="+mn-lt"/>
             </a:endParaRPr>
@@ -13803,10 +13239,10 @@
               </a:spcAft>
             </a:pPr>
             <a:r>
-              <a:rPr lang="" altLang="en-US"/>
+              <a:rPr lang="en-US" altLang="en-US"/>
               <a:t>As the numbe of sub-tasks increase the amount of time saved decreases</a:t>
             </a:r>
-            <a:endParaRPr lang="" altLang="en-US"/>
+            <a:endParaRPr lang="en-US" altLang="en-US"/>
           </a:p>
           <a:p>
             <a:pPr lvl="0">
@@ -13821,10 +13257,10 @@
               </a:spcAft>
             </a:pPr>
             <a:r>
-              <a:rPr lang="" altLang="en-US"/>
+              <a:rPr lang="en-US" altLang="en-US"/>
               <a:t>Leads to asymptotic behavior</a:t>
             </a:r>
-            <a:endParaRPr lang="" altLang="en-US"/>
+            <a:endParaRPr lang="en-US" altLang="en-US"/>
           </a:p>
           <a:p>
             <a:pPr lvl="0">
@@ -13839,10 +13275,10 @@
               </a:spcAft>
             </a:pPr>
             <a:r>
-              <a:rPr lang="" altLang="en-US"/>
+              <a:rPr lang="en-US" altLang="en-US"/>
               <a:t>Tested with two different matrix sizes to confirm this trend</a:t>
             </a:r>
-            <a:endParaRPr lang="" altLang="en-US"/>
+            <a:endParaRPr lang="en-US" altLang="en-US"/>
           </a:p>
           <a:p>
             <a:pPr lvl="0">
@@ -13857,10 +13293,10 @@
               </a:spcAft>
             </a:pPr>
             <a:r>
-              <a:rPr lang="" altLang="en-US"/>
+              <a:rPr lang="en-US" altLang="en-US"/>
               <a:t>Leads me to beleive its down to the specs of the main node</a:t>
             </a:r>
-            <a:endParaRPr lang="" altLang="en-US"/>
+            <a:endParaRPr lang="en-US" altLang="en-US"/>
           </a:p>
         </p:txBody>
       </p:sp>
@@ -13950,139 +13386,154 @@
           </a:graphicData>
         </a:graphic>
       </p:graphicFrame>
-      <p:pic>
-        <p:nvPicPr>
-          <p:cNvPr id="11" name="Picture 10" descr="Screenshot from 2021-05-03 19-16-48"/>
-          <p:cNvPicPr>
-            <a:picLocks noChangeAspect="true"/>
-          </p:cNvPicPr>
+      <p:grpSp>
+        <p:nvGrpSpPr>
+          <p:cNvPr id="3" name="Group 2"/>
+          <p:cNvGrpSpPr/>
           <p:nvPr/>
-        </p:nvPicPr>
-        <p:blipFill>
-          <a:blip r:embed="rId2"/>
-          <a:srcRect l="19679"/>
-          <a:stretch>
-            <a:fillRect/>
-          </a:stretch>
-        </p:blipFill>
-        <p:spPr>
+        </p:nvGrpSpPr>
+        <p:grpSpPr>
           <a:xfrm>
             <a:off x="763270" y="1888490"/>
             <a:ext cx="4759960" cy="1924050"/>
+            <a:chOff x="1202" y="2974"/>
+            <a:chExt cx="7496" cy="3030"/>
           </a:xfrm>
-          <a:prstGeom prst="rect">
-            <a:avLst/>
-          </a:prstGeom>
-        </p:spPr>
-      </p:pic>
-      <p:cxnSp>
-        <p:nvCxnSpPr>
-          <p:cNvPr id="12" name="Straight Arrow Connector 11"/>
-          <p:cNvCxnSpPr/>
-          <p:nvPr/>
-        </p:nvCxnSpPr>
-        <p:spPr>
-          <a:xfrm flipV="true">
-            <a:off x="1993265" y="2393315"/>
-            <a:ext cx="0" cy="1097280"/>
-          </a:xfrm>
-          <a:prstGeom prst="straightConnector1">
-            <a:avLst/>
-          </a:prstGeom>
-          <a:ln w="38100">
-            <a:solidFill>
-              <a:srgbClr val="F4B183"/>
-            </a:solidFill>
-            <a:tailEnd type="arrow" w="med" len="med"/>
-          </a:ln>
-        </p:spPr>
-        <p:style>
-          <a:lnRef idx="3">
-            <a:schemeClr val="accent1"/>
-          </a:lnRef>
-          <a:fillRef idx="0">
-            <a:schemeClr val="accent1"/>
-          </a:fillRef>
-          <a:effectRef idx="2">
-            <a:schemeClr val="accent1"/>
-          </a:effectRef>
-          <a:fontRef idx="minor">
-            <a:schemeClr val="tx1"/>
-          </a:fontRef>
-        </p:style>
-      </p:cxnSp>
-      <p:cxnSp>
-        <p:nvCxnSpPr>
-          <p:cNvPr id="13" name="Straight Arrow Connector 12"/>
-          <p:cNvCxnSpPr/>
-          <p:nvPr/>
-        </p:nvCxnSpPr>
-        <p:spPr>
-          <a:xfrm flipV="true">
-            <a:off x="3166110" y="2393315"/>
-            <a:ext cx="0" cy="1097280"/>
-          </a:xfrm>
-          <a:prstGeom prst="straightConnector1">
-            <a:avLst/>
-          </a:prstGeom>
-          <a:ln w="38100">
-            <a:solidFill>
-              <a:srgbClr val="FFE699"/>
-            </a:solidFill>
-            <a:tailEnd type="arrow" w="med" len="med"/>
-          </a:ln>
-        </p:spPr>
-        <p:style>
-          <a:lnRef idx="3">
-            <a:schemeClr val="accent1"/>
-          </a:lnRef>
-          <a:fillRef idx="0">
-            <a:schemeClr val="accent1"/>
-          </a:fillRef>
-          <a:effectRef idx="2">
-            <a:schemeClr val="accent1"/>
-          </a:effectRef>
-          <a:fontRef idx="minor">
-            <a:schemeClr val="tx1"/>
-          </a:fontRef>
-        </p:style>
-      </p:cxnSp>
-      <p:cxnSp>
-        <p:nvCxnSpPr>
-          <p:cNvPr id="14" name="Straight Arrow Connector 13"/>
-          <p:cNvCxnSpPr/>
-          <p:nvPr/>
-        </p:nvCxnSpPr>
-        <p:spPr>
-          <a:xfrm flipV="true">
-            <a:off x="4344035" y="2807335"/>
-            <a:ext cx="0" cy="640080"/>
-          </a:xfrm>
-          <a:prstGeom prst="straightConnector1">
-            <a:avLst/>
-          </a:prstGeom>
-          <a:ln w="38100">
-            <a:solidFill>
-              <a:srgbClr val="FF6767"/>
-            </a:solidFill>
-            <a:tailEnd type="arrow" w="med" len="med"/>
-          </a:ln>
-        </p:spPr>
-        <p:style>
-          <a:lnRef idx="3">
-            <a:schemeClr val="accent1"/>
-          </a:lnRef>
-          <a:fillRef idx="0">
-            <a:schemeClr val="accent1"/>
-          </a:fillRef>
-          <a:effectRef idx="2">
-            <a:schemeClr val="accent1"/>
-          </a:effectRef>
-          <a:fontRef idx="minor">
-            <a:schemeClr val="tx1"/>
-          </a:fontRef>
-        </p:style>
-      </p:cxnSp>
+        </p:grpSpPr>
+        <p:pic>
+          <p:nvPicPr>
+            <p:cNvPr id="11" name="Picture 10" descr="Screenshot from 2021-05-03 19-16-48"/>
+            <p:cNvPicPr>
+              <a:picLocks noChangeAspect="true"/>
+            </p:cNvPicPr>
+            <p:nvPr/>
+          </p:nvPicPr>
+          <p:blipFill>
+            <a:blip r:embed="rId2"/>
+            <a:srcRect l="19679"/>
+            <a:stretch>
+              <a:fillRect/>
+            </a:stretch>
+          </p:blipFill>
+          <p:spPr>
+            <a:xfrm>
+              <a:off x="1202" y="2974"/>
+              <a:ext cx="7496" cy="3030"/>
+            </a:xfrm>
+            <a:prstGeom prst="rect">
+              <a:avLst/>
+            </a:prstGeom>
+          </p:spPr>
+        </p:pic>
+        <p:cxnSp>
+          <p:nvCxnSpPr>
+            <p:cNvPr id="12" name="Straight Arrow Connector 11"/>
+            <p:cNvCxnSpPr/>
+            <p:nvPr/>
+          </p:nvCxnSpPr>
+          <p:spPr>
+            <a:xfrm flipV="true">
+              <a:off x="3139" y="3769"/>
+              <a:ext cx="0" cy="1728"/>
+            </a:xfrm>
+            <a:prstGeom prst="straightConnector1">
+              <a:avLst/>
+            </a:prstGeom>
+            <a:ln w="38100">
+              <a:solidFill>
+                <a:srgbClr val="F4B183"/>
+              </a:solidFill>
+              <a:tailEnd type="arrow" w="med" len="med"/>
+            </a:ln>
+          </p:spPr>
+          <p:style>
+            <a:lnRef idx="3">
+              <a:schemeClr val="accent1"/>
+            </a:lnRef>
+            <a:fillRef idx="0">
+              <a:schemeClr val="accent1"/>
+            </a:fillRef>
+            <a:effectRef idx="2">
+              <a:schemeClr val="accent1"/>
+            </a:effectRef>
+            <a:fontRef idx="minor">
+              <a:schemeClr val="tx1"/>
+            </a:fontRef>
+          </p:style>
+        </p:cxnSp>
+        <p:cxnSp>
+          <p:nvCxnSpPr>
+            <p:cNvPr id="13" name="Straight Arrow Connector 12"/>
+            <p:cNvCxnSpPr/>
+            <p:nvPr/>
+          </p:nvCxnSpPr>
+          <p:spPr>
+            <a:xfrm flipV="true">
+              <a:off x="4986" y="3769"/>
+              <a:ext cx="0" cy="1728"/>
+            </a:xfrm>
+            <a:prstGeom prst="straightConnector1">
+              <a:avLst/>
+            </a:prstGeom>
+            <a:ln w="38100">
+              <a:solidFill>
+                <a:srgbClr val="FFE699"/>
+              </a:solidFill>
+              <a:tailEnd type="arrow" w="med" len="med"/>
+            </a:ln>
+          </p:spPr>
+          <p:style>
+            <a:lnRef idx="3">
+              <a:schemeClr val="accent1"/>
+            </a:lnRef>
+            <a:fillRef idx="0">
+              <a:schemeClr val="accent1"/>
+            </a:fillRef>
+            <a:effectRef idx="2">
+              <a:schemeClr val="accent1"/>
+            </a:effectRef>
+            <a:fontRef idx="minor">
+              <a:schemeClr val="tx1"/>
+            </a:fontRef>
+          </p:style>
+        </p:cxnSp>
+        <p:cxnSp>
+          <p:nvCxnSpPr>
+            <p:cNvPr id="14" name="Straight Arrow Connector 13"/>
+            <p:cNvCxnSpPr/>
+            <p:nvPr/>
+          </p:nvCxnSpPr>
+          <p:spPr>
+            <a:xfrm flipV="true">
+              <a:off x="6841" y="4421"/>
+              <a:ext cx="0" cy="1008"/>
+            </a:xfrm>
+            <a:prstGeom prst="straightConnector1">
+              <a:avLst/>
+            </a:prstGeom>
+            <a:ln w="38100">
+              <a:solidFill>
+                <a:srgbClr val="FF6767"/>
+              </a:solidFill>
+              <a:tailEnd type="arrow" w="med" len="med"/>
+            </a:ln>
+          </p:spPr>
+          <p:style>
+            <a:lnRef idx="3">
+              <a:schemeClr val="accent1"/>
+            </a:lnRef>
+            <a:fillRef idx="0">
+              <a:schemeClr val="accent1"/>
+            </a:fillRef>
+            <a:effectRef idx="2">
+              <a:schemeClr val="accent1"/>
+            </a:effectRef>
+            <a:fontRef idx="minor">
+              <a:schemeClr val="tx1"/>
+            </a:fontRef>
+          </p:style>
+        </p:cxnSp>
+      </p:grpSp>
       <p:sp>
         <p:nvSpPr>
           <p:cNvPr id="15" name="Content Placeholder 14"/>
@@ -14187,80 +13638,95 @@
           <a:bodyPr/>
           <a:p>
             <a:r>
-              <a:rPr lang="" altLang="en-US" sz="4000">
+              <a:rPr lang="en-US" altLang="en-US" sz="4000">
                 <a:latin typeface="+mn-lt"/>
                 <a:cs typeface="+mn-lt"/>
               </a:rPr>
               <a:t>Caching Vs. No Caching</a:t>
             </a:r>
-            <a:endParaRPr lang="" altLang="en-US" sz="4000">
+            <a:endParaRPr lang="en-US" altLang="en-US" sz="4000">
               <a:latin typeface="+mn-lt"/>
               <a:cs typeface="+mn-lt"/>
             </a:endParaRPr>
           </a:p>
         </p:txBody>
       </p:sp>
-      <p:pic>
-        <p:nvPicPr>
-          <p:cNvPr id="11" name="Picture 10" descr="Screenshot from 2021-05-03 19-16-48"/>
-          <p:cNvPicPr>
-            <a:picLocks noChangeAspect="true"/>
-          </p:cNvPicPr>
+      <p:grpSp>
+        <p:nvGrpSpPr>
+          <p:cNvPr id="5" name="Group 4"/>
+          <p:cNvGrpSpPr/>
           <p:nvPr/>
-        </p:nvPicPr>
-        <p:blipFill>
-          <a:blip r:embed="rId2"/>
-          <a:srcRect l="19679"/>
-          <a:stretch>
-            <a:fillRect/>
-          </a:stretch>
-        </p:blipFill>
-        <p:spPr>
+        </p:nvGrpSpPr>
+        <p:grpSpPr>
           <a:xfrm>
-            <a:off x="7332345" y="448310"/>
-            <a:ext cx="4191635" cy="1694180"/>
+            <a:off x="7320280" y="448310"/>
+            <a:ext cx="4191000" cy="1694180"/>
+            <a:chOff x="11547" y="706"/>
+            <a:chExt cx="6600" cy="2668"/>
           </a:xfrm>
-          <a:prstGeom prst="rect">
-            <a:avLst/>
-          </a:prstGeom>
-        </p:spPr>
-      </p:pic>
-      <p:cxnSp>
-        <p:nvCxnSpPr>
-          <p:cNvPr id="12" name="Straight Arrow Connector 11"/>
-          <p:cNvCxnSpPr/>
-          <p:nvPr/>
-        </p:nvCxnSpPr>
-        <p:spPr>
-          <a:xfrm flipV="true">
-            <a:off x="8418830" y="878840"/>
-            <a:ext cx="0" cy="548640"/>
-          </a:xfrm>
-          <a:prstGeom prst="straightConnector1">
-            <a:avLst/>
-          </a:prstGeom>
-          <a:ln w="38100">
-            <a:solidFill>
-              <a:srgbClr val="323232"/>
-            </a:solidFill>
-            <a:tailEnd type="arrow" w="med" len="med"/>
-          </a:ln>
-        </p:spPr>
-        <p:style>
-          <a:lnRef idx="3">
-            <a:schemeClr val="accent1"/>
-          </a:lnRef>
-          <a:fillRef idx="0">
-            <a:schemeClr val="accent1"/>
-          </a:fillRef>
-          <a:effectRef idx="2">
-            <a:schemeClr val="accent1"/>
-          </a:effectRef>
-          <a:fontRef idx="minor">
-            <a:schemeClr val="tx1"/>
-          </a:fontRef>
-        </p:style>
-      </p:cxnSp>
+        </p:grpSpPr>
+        <p:pic>
+          <p:nvPicPr>
+            <p:cNvPr id="11" name="Picture 10" descr="Screenshot from 2021-05-03 19-16-48"/>
+            <p:cNvPicPr>
+              <a:picLocks noChangeAspect="true"/>
+            </p:cNvPicPr>
+            <p:nvPr/>
+          </p:nvPicPr>
+          <p:blipFill>
+            <a:blip r:embed="rId2"/>
+            <a:srcRect l="19679"/>
+            <a:stretch>
+              <a:fillRect/>
+            </a:stretch>
+          </p:blipFill>
+          <p:spPr>
+            <a:xfrm>
+              <a:off x="11547" y="706"/>
+              <a:ext cx="6601" cy="2668"/>
+            </a:xfrm>
+            <a:prstGeom prst="rect">
+              <a:avLst/>
+            </a:prstGeom>
+          </p:spPr>
+        </p:pic>
+        <p:cxnSp>
+          <p:nvCxnSpPr>
+            <p:cNvPr id="12" name="Straight Arrow Connector 11"/>
+            <p:cNvCxnSpPr/>
+            <p:nvPr/>
+          </p:nvCxnSpPr>
+          <p:spPr>
+            <a:xfrm flipV="true">
+              <a:off x="13258" y="1384"/>
+              <a:ext cx="0" cy="864"/>
+            </a:xfrm>
+            <a:prstGeom prst="straightConnector1">
+              <a:avLst/>
+            </a:prstGeom>
+            <a:ln w="38100">
+              <a:solidFill>
+                <a:srgbClr val="323232"/>
+              </a:solidFill>
+              <a:tailEnd type="arrow" w="med" len="med"/>
+            </a:ln>
+          </p:spPr>
+          <p:style>
+            <a:lnRef idx="3">
+              <a:schemeClr val="accent1"/>
+            </a:lnRef>
+            <a:fillRef idx="0">
+              <a:schemeClr val="accent1"/>
+            </a:fillRef>
+            <a:effectRef idx="2">
+              <a:schemeClr val="accent1"/>
+            </a:effectRef>
+            <a:fontRef idx="minor">
+              <a:schemeClr val="tx1"/>
+            </a:fontRef>
+          </p:style>
+        </p:cxnSp>
+      </p:grpSp>
       <p:sp>
         <p:nvSpPr>
           <p:cNvPr id="15" name="Content Placeholder 14"/>
@@ -14294,10 +13760,10 @@
               </a:spcAft>
             </a:pPr>
             <a:r>
-              <a:rPr lang="" altLang="en-US"/>
+              <a:rPr lang="en-US" altLang="en-US"/>
               <a:t>Main purpose is to reduce overhead in the event of a node failure</a:t>
             </a:r>
-            <a:endParaRPr lang="" altLang="en-US"/>
+            <a:endParaRPr lang="en-US" altLang="en-US"/>
           </a:p>
           <a:p>
             <a:pPr lvl="0">
@@ -14312,29 +13778,13 @@
               </a:spcAft>
             </a:pPr>
             <a:r>
-              <a:rPr lang="" altLang="en-US"/>
+              <a:rPr lang="en-US" altLang="en-US"/>
               <a:t>The point point at which the node was terminated is shown below</a:t>
             </a:r>
-            <a:endParaRPr lang="" altLang="en-US"/>
+            <a:endParaRPr lang="en-US" altLang="en-US"/>
           </a:p>
         </p:txBody>
       </p:sp>
-      <p:graphicFrame>
-        <p:nvGraphicFramePr>
-          <p:cNvPr id="3" name="Chart 2"/>
-          <p:cNvGraphicFramePr/>
-          <p:nvPr/>
-        </p:nvGraphicFramePr>
-        <p:xfrm>
-          <a:off x="6740525" y="2427605"/>
-          <a:ext cx="5219700" cy="4242435"/>
-        </p:xfrm>
-        <a:graphic>
-          <a:graphicData uri="http://schemas.openxmlformats.org/drawingml/2006/chart">
-            <c:chart xmlns:c="http://schemas.openxmlformats.org/drawingml/2006/chart" xmlns:r="http://schemas.openxmlformats.org/officeDocument/2006/relationships" r:id="rId1"/>
-          </a:graphicData>
-        </a:graphic>
-      </p:graphicFrame>
       <p:sp>
         <p:nvSpPr>
           <p:cNvPr id="4" name="Content Placeholder 14"/>
@@ -14573,6 +14023,22 @@
           </a:p>
         </p:txBody>
       </p:sp>
+      <p:graphicFrame>
+        <p:nvGraphicFramePr>
+          <p:cNvPr id="7" name="Chart 6"/>
+          <p:cNvGraphicFramePr/>
+          <p:nvPr/>
+        </p:nvGraphicFramePr>
+        <p:xfrm>
+          <a:off x="6740525" y="2427605"/>
+          <a:ext cx="5219700" cy="4242435"/>
+        </p:xfrm>
+        <a:graphic>
+          <a:graphicData uri="http://schemas.openxmlformats.org/drawingml/2006/chart">
+            <c:chart xmlns:c="http://schemas.openxmlformats.org/drawingml/2006/chart" xmlns:r="http://schemas.openxmlformats.org/officeDocument/2006/relationships" r:id="rId1"/>
+          </a:graphicData>
+        </a:graphic>
+      </p:graphicFrame>
     </p:spTree>
   </p:cSld>
   <p:clrMapOvr>

</xml_diff>